<commit_message>
slight change in NcMLvsFeactureCollections powerpoint
</commit_message>
<xml_diff>
--- a/docs/website/tds/tutorial/NcMLvsFeatureCollections.pptx
+++ b/docs/website/tds/tutorial/NcMLvsFeatureCollections.pptx
@@ -296,7 +296,7 @@
             <a:fld id="{8DF66C97-51D1-4C46-A462-47E7CAC852FA}" type="datetimeFigureOut">
               <a:rPr lang="en-US" smtClean="0"/>
               <a:pPr/>
-              <a:t>7/23/13</a:t>
+              <a:t>10/24/14</a:t>
             </a:fld>
             <a:endParaRPr lang="en-US"/>
           </a:p>
@@ -463,7 +463,7 @@
             <a:fld id="{8DF66C97-51D1-4C46-A462-47E7CAC852FA}" type="datetimeFigureOut">
               <a:rPr lang="en-US" smtClean="0"/>
               <a:pPr/>
-              <a:t>7/23/13</a:t>
+              <a:t>10/24/14</a:t>
             </a:fld>
             <a:endParaRPr lang="en-US"/>
           </a:p>
@@ -640,7 +640,7 @@
             <a:fld id="{8DF66C97-51D1-4C46-A462-47E7CAC852FA}" type="datetimeFigureOut">
               <a:rPr lang="en-US" smtClean="0"/>
               <a:pPr/>
-              <a:t>7/23/13</a:t>
+              <a:t>10/24/14</a:t>
             </a:fld>
             <a:endParaRPr lang="en-US"/>
           </a:p>
@@ -807,7 +807,7 @@
             <a:fld id="{8DF66C97-51D1-4C46-A462-47E7CAC852FA}" type="datetimeFigureOut">
               <a:rPr lang="en-US" smtClean="0"/>
               <a:pPr/>
-              <a:t>7/23/13</a:t>
+              <a:t>10/24/14</a:t>
             </a:fld>
             <a:endParaRPr lang="en-US"/>
           </a:p>
@@ -1050,7 +1050,7 @@
             <a:fld id="{8DF66C97-51D1-4C46-A462-47E7CAC852FA}" type="datetimeFigureOut">
               <a:rPr lang="en-US" smtClean="0"/>
               <a:pPr/>
-              <a:t>7/23/13</a:t>
+              <a:t>10/24/14</a:t>
             </a:fld>
             <a:endParaRPr lang="en-US"/>
           </a:p>
@@ -1335,7 +1335,7 @@
             <a:fld id="{8DF66C97-51D1-4C46-A462-47E7CAC852FA}" type="datetimeFigureOut">
               <a:rPr lang="en-US" smtClean="0"/>
               <a:pPr/>
-              <a:t>7/23/13</a:t>
+              <a:t>10/24/14</a:t>
             </a:fld>
             <a:endParaRPr lang="en-US"/>
           </a:p>
@@ -1754,7 +1754,7 @@
             <a:fld id="{8DF66C97-51D1-4C46-A462-47E7CAC852FA}" type="datetimeFigureOut">
               <a:rPr lang="en-US" smtClean="0"/>
               <a:pPr/>
-              <a:t>7/23/13</a:t>
+              <a:t>10/24/14</a:t>
             </a:fld>
             <a:endParaRPr lang="en-US"/>
           </a:p>
@@ -1869,7 +1869,7 @@
             <a:fld id="{8DF66C97-51D1-4C46-A462-47E7CAC852FA}" type="datetimeFigureOut">
               <a:rPr lang="en-US" smtClean="0"/>
               <a:pPr/>
-              <a:t>7/23/13</a:t>
+              <a:t>10/24/14</a:t>
             </a:fld>
             <a:endParaRPr lang="en-US"/>
           </a:p>
@@ -1961,7 +1961,7 @@
             <a:fld id="{8DF66C97-51D1-4C46-A462-47E7CAC852FA}" type="datetimeFigureOut">
               <a:rPr lang="en-US" smtClean="0"/>
               <a:pPr/>
-              <a:t>7/23/13</a:t>
+              <a:t>10/24/14</a:t>
             </a:fld>
             <a:endParaRPr lang="en-US"/>
           </a:p>
@@ -2235,7 +2235,7 @@
             <a:fld id="{8DF66C97-51D1-4C46-A462-47E7CAC852FA}" type="datetimeFigureOut">
               <a:rPr lang="en-US" smtClean="0"/>
               <a:pPr/>
-              <a:t>7/23/13</a:t>
+              <a:t>10/24/14</a:t>
             </a:fld>
             <a:endParaRPr lang="en-US"/>
           </a:p>
@@ -2485,7 +2485,7 @@
             <a:fld id="{8DF66C97-51D1-4C46-A462-47E7CAC852FA}" type="datetimeFigureOut">
               <a:rPr lang="en-US" smtClean="0"/>
               <a:pPr/>
-              <a:t>7/23/13</a:t>
+              <a:t>10/24/14</a:t>
             </a:fld>
             <a:endParaRPr lang="en-US"/>
           </a:p>
@@ -2695,7 +2695,7 @@
             <a:fld id="{8DF66C97-51D1-4C46-A462-47E7CAC852FA}" type="datetimeFigureOut">
               <a:rPr lang="en-US" smtClean="0"/>
               <a:pPr/>
-              <a:t>7/23/13</a:t>
+              <a:t>10/24/14</a:t>
             </a:fld>
             <a:endParaRPr lang="en-US"/>
           </a:p>
@@ -8063,7 +8063,7 @@
         <p:spPr/>
         <p:txBody>
           <a:bodyPr>
-            <a:normAutofit fontScale="92500" lnSpcReduction="20000"/>
+            <a:normAutofit lnSpcReduction="10000"/>
           </a:bodyPr>
           <a:lstStyle/>
           <a:p>
@@ -8118,21 +8118,13 @@
             </a:r>
           </a:p>
           <a:p>
-            <a:pPr lvl="1"/>
             <a:r>
               <a:rPr lang="en-US" dirty="0" smtClean="0"/>
-              <a:t>Details </a:t>
-            </a:r>
-            <a:r>
-              <a:rPr lang="en-US" smtClean="0"/>
-              <a:t>tommorrow</a:t>
-            </a:r>
-            <a:endParaRPr lang="en-US" dirty="0" smtClean="0"/>
-          </a:p>
-          <a:p>
+              <a:t>If </a:t>
+            </a:r>
             <a:r>
               <a:rPr lang="en-US" dirty="0" smtClean="0"/>
-              <a:t>If you have GRIB files</a:t>
+              <a:t>you have GRIB files</a:t>
             </a:r>
           </a:p>
           <a:p>

</xml_diff>